<commit_message>
add create gt job
</commit_message>
<xml_diff>
--- a/images_for_ipynb/image_resource.pptx
+++ b/images_for_ipynb/image_resource.pptx
@@ -272,9 +272,9 @@
           <a:p>
             <a:fld id="{C58386F1-37CF-4CAC-89F9-22A5833C6FCA}" type="datetimeFigureOut">
               <a:rPr kumimoji="1" lang="ja-JP" altLang="en-US" smtClean="0"/>
-              <a:t>2021/11/18</a:t>
+              <a:t>2021/11/19</a:t>
             </a:fld>
-            <a:endParaRPr kumimoji="1" lang="ja-JP" altLang="en-US"/>
+            <a:endParaRPr kumimoji="1" lang="ja-JP" altLang="en-US" dirty="0"/>
           </a:p>
         </p:txBody>
       </p:sp>
@@ -299,7 +299,7 @@
           <a:bodyPr/>
           <a:lstStyle/>
           <a:p>
-            <a:endParaRPr kumimoji="1" lang="ja-JP" altLang="en-US"/>
+            <a:endParaRPr kumimoji="1" lang="ja-JP" altLang="en-US" dirty="0"/>
           </a:p>
         </p:txBody>
       </p:sp>
@@ -328,7 +328,7 @@
               <a:rPr kumimoji="1" lang="ja-JP" altLang="en-US" smtClean="0"/>
               <a:t>‹#›</a:t>
             </a:fld>
-            <a:endParaRPr kumimoji="1" lang="ja-JP" altLang="en-US"/>
+            <a:endParaRPr kumimoji="1" lang="ja-JP" altLang="en-US" dirty="0"/>
           </a:p>
         </p:txBody>
       </p:sp>
@@ -502,9 +502,9 @@
           <a:p>
             <a:fld id="{C58386F1-37CF-4CAC-89F9-22A5833C6FCA}" type="datetimeFigureOut">
               <a:rPr kumimoji="1" lang="ja-JP" altLang="en-US" smtClean="0"/>
-              <a:t>2021/11/18</a:t>
+              <a:t>2021/11/19</a:t>
             </a:fld>
-            <a:endParaRPr kumimoji="1" lang="ja-JP" altLang="en-US"/>
+            <a:endParaRPr kumimoji="1" lang="ja-JP" altLang="en-US" dirty="0"/>
           </a:p>
         </p:txBody>
       </p:sp>
@@ -529,7 +529,7 @@
           <a:bodyPr/>
           <a:lstStyle/>
           <a:p>
-            <a:endParaRPr kumimoji="1" lang="ja-JP" altLang="en-US"/>
+            <a:endParaRPr kumimoji="1" lang="ja-JP" altLang="en-US" dirty="0"/>
           </a:p>
         </p:txBody>
       </p:sp>
@@ -558,7 +558,7 @@
               <a:rPr kumimoji="1" lang="ja-JP" altLang="en-US" smtClean="0"/>
               <a:t>‹#›</a:t>
             </a:fld>
-            <a:endParaRPr kumimoji="1" lang="ja-JP" altLang="en-US"/>
+            <a:endParaRPr kumimoji="1" lang="ja-JP" altLang="en-US" dirty="0"/>
           </a:p>
         </p:txBody>
       </p:sp>
@@ -742,9 +742,9 @@
           <a:p>
             <a:fld id="{C58386F1-37CF-4CAC-89F9-22A5833C6FCA}" type="datetimeFigureOut">
               <a:rPr kumimoji="1" lang="ja-JP" altLang="en-US" smtClean="0"/>
-              <a:t>2021/11/18</a:t>
+              <a:t>2021/11/19</a:t>
             </a:fld>
-            <a:endParaRPr kumimoji="1" lang="ja-JP" altLang="en-US"/>
+            <a:endParaRPr kumimoji="1" lang="ja-JP" altLang="en-US" dirty="0"/>
           </a:p>
         </p:txBody>
       </p:sp>
@@ -769,7 +769,7 @@
           <a:bodyPr/>
           <a:lstStyle/>
           <a:p>
-            <a:endParaRPr kumimoji="1" lang="ja-JP" altLang="en-US"/>
+            <a:endParaRPr kumimoji="1" lang="ja-JP" altLang="en-US" dirty="0"/>
           </a:p>
         </p:txBody>
       </p:sp>
@@ -798,7 +798,7 @@
               <a:rPr kumimoji="1" lang="ja-JP" altLang="en-US" smtClean="0"/>
               <a:t>‹#›</a:t>
             </a:fld>
-            <a:endParaRPr kumimoji="1" lang="ja-JP" altLang="en-US"/>
+            <a:endParaRPr kumimoji="1" lang="ja-JP" altLang="en-US" dirty="0"/>
           </a:p>
         </p:txBody>
       </p:sp>
@@ -972,9 +972,9 @@
           <a:p>
             <a:fld id="{C58386F1-37CF-4CAC-89F9-22A5833C6FCA}" type="datetimeFigureOut">
               <a:rPr kumimoji="1" lang="ja-JP" altLang="en-US" smtClean="0"/>
-              <a:t>2021/11/18</a:t>
+              <a:t>2021/11/19</a:t>
             </a:fld>
-            <a:endParaRPr kumimoji="1" lang="ja-JP" altLang="en-US"/>
+            <a:endParaRPr kumimoji="1" lang="ja-JP" altLang="en-US" dirty="0"/>
           </a:p>
         </p:txBody>
       </p:sp>
@@ -999,7 +999,7 @@
           <a:bodyPr/>
           <a:lstStyle/>
           <a:p>
-            <a:endParaRPr kumimoji="1" lang="ja-JP" altLang="en-US"/>
+            <a:endParaRPr kumimoji="1" lang="ja-JP" altLang="en-US" dirty="0"/>
           </a:p>
         </p:txBody>
       </p:sp>
@@ -1028,7 +1028,7 @@
               <a:rPr kumimoji="1" lang="ja-JP" altLang="en-US" smtClean="0"/>
               <a:t>‹#›</a:t>
             </a:fld>
-            <a:endParaRPr kumimoji="1" lang="ja-JP" altLang="en-US"/>
+            <a:endParaRPr kumimoji="1" lang="ja-JP" altLang="en-US" dirty="0"/>
           </a:p>
         </p:txBody>
       </p:sp>
@@ -1247,9 +1247,9 @@
           <a:p>
             <a:fld id="{C58386F1-37CF-4CAC-89F9-22A5833C6FCA}" type="datetimeFigureOut">
               <a:rPr kumimoji="1" lang="ja-JP" altLang="en-US" smtClean="0"/>
-              <a:t>2021/11/18</a:t>
+              <a:t>2021/11/19</a:t>
             </a:fld>
-            <a:endParaRPr kumimoji="1" lang="ja-JP" altLang="en-US"/>
+            <a:endParaRPr kumimoji="1" lang="ja-JP" altLang="en-US" dirty="0"/>
           </a:p>
         </p:txBody>
       </p:sp>
@@ -1274,7 +1274,7 @@
           <a:bodyPr/>
           <a:lstStyle/>
           <a:p>
-            <a:endParaRPr kumimoji="1" lang="ja-JP" altLang="en-US"/>
+            <a:endParaRPr kumimoji="1" lang="ja-JP" altLang="en-US" dirty="0"/>
           </a:p>
         </p:txBody>
       </p:sp>
@@ -1303,7 +1303,7 @@
               <a:rPr kumimoji="1" lang="ja-JP" altLang="en-US" smtClean="0"/>
               <a:t>‹#›</a:t>
             </a:fld>
-            <a:endParaRPr kumimoji="1" lang="ja-JP" altLang="en-US"/>
+            <a:endParaRPr kumimoji="1" lang="ja-JP" altLang="en-US" dirty="0"/>
           </a:p>
         </p:txBody>
       </p:sp>
@@ -1576,9 +1576,9 @@
           <a:p>
             <a:fld id="{C58386F1-37CF-4CAC-89F9-22A5833C6FCA}" type="datetimeFigureOut">
               <a:rPr kumimoji="1" lang="ja-JP" altLang="en-US" smtClean="0"/>
-              <a:t>2021/11/18</a:t>
+              <a:t>2021/11/19</a:t>
             </a:fld>
-            <a:endParaRPr kumimoji="1" lang="ja-JP" altLang="en-US"/>
+            <a:endParaRPr kumimoji="1" lang="ja-JP" altLang="en-US" dirty="0"/>
           </a:p>
         </p:txBody>
       </p:sp>
@@ -1603,7 +1603,7 @@
           <a:bodyPr/>
           <a:lstStyle/>
           <a:p>
-            <a:endParaRPr kumimoji="1" lang="ja-JP" altLang="en-US"/>
+            <a:endParaRPr kumimoji="1" lang="ja-JP" altLang="en-US" dirty="0"/>
           </a:p>
         </p:txBody>
       </p:sp>
@@ -1632,7 +1632,7 @@
               <a:rPr kumimoji="1" lang="ja-JP" altLang="en-US" smtClean="0"/>
               <a:t>‹#›</a:t>
             </a:fld>
-            <a:endParaRPr kumimoji="1" lang="ja-JP" altLang="en-US"/>
+            <a:endParaRPr kumimoji="1" lang="ja-JP" altLang="en-US" dirty="0"/>
           </a:p>
         </p:txBody>
       </p:sp>
@@ -2052,9 +2052,9 @@
           <a:p>
             <a:fld id="{C58386F1-37CF-4CAC-89F9-22A5833C6FCA}" type="datetimeFigureOut">
               <a:rPr kumimoji="1" lang="ja-JP" altLang="en-US" smtClean="0"/>
-              <a:t>2021/11/18</a:t>
+              <a:t>2021/11/19</a:t>
             </a:fld>
-            <a:endParaRPr kumimoji="1" lang="ja-JP" altLang="en-US"/>
+            <a:endParaRPr kumimoji="1" lang="ja-JP" altLang="en-US" dirty="0"/>
           </a:p>
         </p:txBody>
       </p:sp>
@@ -2079,7 +2079,7 @@
           <a:bodyPr/>
           <a:lstStyle/>
           <a:p>
-            <a:endParaRPr kumimoji="1" lang="ja-JP" altLang="en-US"/>
+            <a:endParaRPr kumimoji="1" lang="ja-JP" altLang="en-US" dirty="0"/>
           </a:p>
         </p:txBody>
       </p:sp>
@@ -2108,7 +2108,7 @@
               <a:rPr kumimoji="1" lang="ja-JP" altLang="en-US" smtClean="0"/>
               <a:t>‹#›</a:t>
             </a:fld>
-            <a:endParaRPr kumimoji="1" lang="ja-JP" altLang="en-US"/>
+            <a:endParaRPr kumimoji="1" lang="ja-JP" altLang="en-US" dirty="0"/>
           </a:p>
         </p:txBody>
       </p:sp>
@@ -2193,9 +2193,9 @@
           <a:p>
             <a:fld id="{C58386F1-37CF-4CAC-89F9-22A5833C6FCA}" type="datetimeFigureOut">
               <a:rPr kumimoji="1" lang="ja-JP" altLang="en-US" smtClean="0"/>
-              <a:t>2021/11/18</a:t>
+              <a:t>2021/11/19</a:t>
             </a:fld>
-            <a:endParaRPr kumimoji="1" lang="ja-JP" altLang="en-US"/>
+            <a:endParaRPr kumimoji="1" lang="ja-JP" altLang="en-US" dirty="0"/>
           </a:p>
         </p:txBody>
       </p:sp>
@@ -2220,7 +2220,7 @@
           <a:bodyPr/>
           <a:lstStyle/>
           <a:p>
-            <a:endParaRPr kumimoji="1" lang="ja-JP" altLang="en-US"/>
+            <a:endParaRPr kumimoji="1" lang="ja-JP" altLang="en-US" dirty="0"/>
           </a:p>
         </p:txBody>
       </p:sp>
@@ -2249,7 +2249,7 @@
               <a:rPr kumimoji="1" lang="ja-JP" altLang="en-US" smtClean="0"/>
               <a:t>‹#›</a:t>
             </a:fld>
-            <a:endParaRPr kumimoji="1" lang="ja-JP" altLang="en-US"/>
+            <a:endParaRPr kumimoji="1" lang="ja-JP" altLang="en-US" dirty="0"/>
           </a:p>
         </p:txBody>
       </p:sp>
@@ -2306,9 +2306,9 @@
           <a:p>
             <a:fld id="{C58386F1-37CF-4CAC-89F9-22A5833C6FCA}" type="datetimeFigureOut">
               <a:rPr kumimoji="1" lang="ja-JP" altLang="en-US" smtClean="0"/>
-              <a:t>2021/11/18</a:t>
+              <a:t>2021/11/19</a:t>
             </a:fld>
-            <a:endParaRPr kumimoji="1" lang="ja-JP" altLang="en-US"/>
+            <a:endParaRPr kumimoji="1" lang="ja-JP" altLang="en-US" dirty="0"/>
           </a:p>
         </p:txBody>
       </p:sp>
@@ -2333,7 +2333,7 @@
           <a:bodyPr/>
           <a:lstStyle/>
           <a:p>
-            <a:endParaRPr kumimoji="1" lang="ja-JP" altLang="en-US"/>
+            <a:endParaRPr kumimoji="1" lang="ja-JP" altLang="en-US" dirty="0"/>
           </a:p>
         </p:txBody>
       </p:sp>
@@ -2362,7 +2362,7 @@
               <a:rPr kumimoji="1" lang="ja-JP" altLang="en-US" smtClean="0"/>
               <a:t>‹#›</a:t>
             </a:fld>
-            <a:endParaRPr kumimoji="1" lang="ja-JP" altLang="en-US"/>
+            <a:endParaRPr kumimoji="1" lang="ja-JP" altLang="en-US" dirty="0"/>
           </a:p>
         </p:txBody>
       </p:sp>
@@ -2649,9 +2649,9 @@
           <a:p>
             <a:fld id="{C58386F1-37CF-4CAC-89F9-22A5833C6FCA}" type="datetimeFigureOut">
               <a:rPr kumimoji="1" lang="ja-JP" altLang="en-US" smtClean="0"/>
-              <a:t>2021/11/18</a:t>
+              <a:t>2021/11/19</a:t>
             </a:fld>
-            <a:endParaRPr kumimoji="1" lang="ja-JP" altLang="en-US"/>
+            <a:endParaRPr kumimoji="1" lang="ja-JP" altLang="en-US" dirty="0"/>
           </a:p>
         </p:txBody>
       </p:sp>
@@ -2676,7 +2676,7 @@
           <a:bodyPr/>
           <a:lstStyle/>
           <a:p>
-            <a:endParaRPr kumimoji="1" lang="ja-JP" altLang="en-US"/>
+            <a:endParaRPr kumimoji="1" lang="ja-JP" altLang="en-US" dirty="0"/>
           </a:p>
         </p:txBody>
       </p:sp>
@@ -2705,7 +2705,7 @@
               <a:rPr kumimoji="1" lang="ja-JP" altLang="en-US" smtClean="0"/>
               <a:t>‹#›</a:t>
             </a:fld>
-            <a:endParaRPr kumimoji="1" lang="ja-JP" altLang="en-US"/>
+            <a:endParaRPr kumimoji="1" lang="ja-JP" altLang="en-US" dirty="0"/>
           </a:p>
         </p:txBody>
       </p:sp>
@@ -2839,7 +2839,7 @@
             </a:lvl9pPr>
           </a:lstStyle>
           <a:p>
-            <a:endParaRPr kumimoji="1" lang="ja-JP" altLang="en-US"/>
+            <a:endParaRPr kumimoji="1" lang="ja-JP" altLang="en-US" dirty="0"/>
           </a:p>
         </p:txBody>
       </p:sp>
@@ -2937,9 +2937,9 @@
           <a:p>
             <a:fld id="{C58386F1-37CF-4CAC-89F9-22A5833C6FCA}" type="datetimeFigureOut">
               <a:rPr kumimoji="1" lang="ja-JP" altLang="en-US" smtClean="0"/>
-              <a:t>2021/11/18</a:t>
+              <a:t>2021/11/19</a:t>
             </a:fld>
-            <a:endParaRPr kumimoji="1" lang="ja-JP" altLang="en-US"/>
+            <a:endParaRPr kumimoji="1" lang="ja-JP" altLang="en-US" dirty="0"/>
           </a:p>
         </p:txBody>
       </p:sp>
@@ -2964,7 +2964,7 @@
           <a:bodyPr/>
           <a:lstStyle/>
           <a:p>
-            <a:endParaRPr kumimoji="1" lang="ja-JP" altLang="en-US"/>
+            <a:endParaRPr kumimoji="1" lang="ja-JP" altLang="en-US" dirty="0"/>
           </a:p>
         </p:txBody>
       </p:sp>
@@ -2993,7 +2993,7 @@
               <a:rPr kumimoji="1" lang="ja-JP" altLang="en-US" smtClean="0"/>
               <a:t>‹#›</a:t>
             </a:fld>
-            <a:endParaRPr kumimoji="1" lang="ja-JP" altLang="en-US"/>
+            <a:endParaRPr kumimoji="1" lang="ja-JP" altLang="en-US" dirty="0"/>
           </a:p>
         </p:txBody>
       </p:sp>
@@ -3210,9 +3210,9 @@
           <a:p>
             <a:fld id="{C58386F1-37CF-4CAC-89F9-22A5833C6FCA}" type="datetimeFigureOut">
               <a:rPr kumimoji="1" lang="ja-JP" altLang="en-US" smtClean="0"/>
-              <a:t>2021/11/18</a:t>
+              <a:t>2021/11/19</a:t>
             </a:fld>
-            <a:endParaRPr kumimoji="1" lang="ja-JP" altLang="en-US"/>
+            <a:endParaRPr kumimoji="1" lang="ja-JP" altLang="en-US" dirty="0"/>
           </a:p>
         </p:txBody>
       </p:sp>
@@ -3255,7 +3255,7 @@
             </a:lvl1pPr>
           </a:lstStyle>
           <a:p>
-            <a:endParaRPr kumimoji="1" lang="ja-JP" altLang="en-US"/>
+            <a:endParaRPr kumimoji="1" lang="ja-JP" altLang="en-US" dirty="0"/>
           </a:p>
         </p:txBody>
       </p:sp>
@@ -3302,7 +3302,7 @@
               <a:rPr kumimoji="1" lang="ja-JP" altLang="en-US" smtClean="0"/>
               <a:t>‹#›</a:t>
             </a:fld>
-            <a:endParaRPr kumimoji="1" lang="ja-JP" altLang="en-US"/>
+            <a:endParaRPr kumimoji="1" lang="ja-JP" altLang="en-US" dirty="0"/>
           </a:p>
         </p:txBody>
       </p:sp>
@@ -3725,7 +3725,7 @@
             <a:lstStyle/>
             <a:p>
               <a:pPr algn="ctr"/>
-              <a:endParaRPr kumimoji="1" lang="ja-JP" altLang="en-US"/>
+              <a:endParaRPr kumimoji="1" lang="ja-JP" altLang="en-US" dirty="0"/>
             </a:p>
           </p:txBody>
         </p:sp>
@@ -3777,7 +3777,7 @@
             <a:lstStyle/>
             <a:p>
               <a:pPr algn="ctr"/>
-              <a:endParaRPr kumimoji="1" lang="ja-JP" altLang="en-US"/>
+              <a:endParaRPr kumimoji="1" lang="ja-JP" altLang="en-US" dirty="0"/>
             </a:p>
           </p:txBody>
         </p:sp>
@@ -3890,7 +3890,7 @@
           <a:lstStyle/>
           <a:p>
             <a:pPr algn="ctr"/>
-            <a:endParaRPr kumimoji="1" lang="ja-JP" altLang="en-US"/>
+            <a:endParaRPr kumimoji="1" lang="ja-JP" altLang="en-US" dirty="0"/>
           </a:p>
         </p:txBody>
       </p:sp>
@@ -4002,7 +4002,7 @@
           <a:lstStyle/>
           <a:p>
             <a:pPr algn="ctr"/>
-            <a:endParaRPr kumimoji="1" lang="ja-JP" altLang="en-US"/>
+            <a:endParaRPr kumimoji="1" lang="ja-JP" altLang="en-US" dirty="0"/>
           </a:p>
         </p:txBody>
       </p:sp>
@@ -4054,7 +4054,7 @@
           <a:lstStyle/>
           <a:p>
             <a:pPr algn="ctr"/>
-            <a:endParaRPr kumimoji="1" lang="ja-JP" altLang="en-US"/>
+            <a:endParaRPr kumimoji="1" lang="ja-JP" altLang="en-US" dirty="0"/>
           </a:p>
         </p:txBody>
       </p:sp>
@@ -4166,7 +4166,7 @@
           <a:lstStyle/>
           <a:p>
             <a:pPr algn="ctr"/>
-            <a:endParaRPr kumimoji="1" lang="ja-JP" altLang="en-US"/>
+            <a:endParaRPr kumimoji="1" lang="ja-JP" altLang="en-US" dirty="0"/>
           </a:p>
         </p:txBody>
       </p:sp>
@@ -4218,7 +4218,7 @@
           <a:lstStyle/>
           <a:p>
             <a:pPr algn="ctr"/>
-            <a:endParaRPr kumimoji="1" lang="ja-JP" altLang="en-US"/>
+            <a:endParaRPr kumimoji="1" lang="ja-JP" altLang="en-US" dirty="0"/>
           </a:p>
         </p:txBody>
       </p:sp>
@@ -4270,7 +4270,7 @@
           <a:lstStyle/>
           <a:p>
             <a:pPr algn="ctr"/>
-            <a:endParaRPr kumimoji="1" lang="ja-JP" altLang="en-US"/>
+            <a:endParaRPr kumimoji="1" lang="ja-JP" altLang="en-US" dirty="0"/>
           </a:p>
         </p:txBody>
       </p:sp>
@@ -4322,7 +4322,7 @@
           <a:lstStyle/>
           <a:p>
             <a:pPr algn="ctr"/>
-            <a:endParaRPr kumimoji="1" lang="ja-JP" altLang="en-US"/>
+            <a:endParaRPr kumimoji="1" lang="ja-JP" altLang="en-US" dirty="0"/>
           </a:p>
         </p:txBody>
       </p:sp>
@@ -4374,7 +4374,7 @@
           <a:lstStyle/>
           <a:p>
             <a:pPr algn="ctr"/>
-            <a:endParaRPr kumimoji="1" lang="ja-JP" altLang="en-US"/>
+            <a:endParaRPr kumimoji="1" lang="ja-JP" altLang="en-US" dirty="0"/>
           </a:p>
         </p:txBody>
       </p:sp>
@@ -4426,7 +4426,7 @@
           <a:lstStyle/>
           <a:p>
             <a:pPr algn="ctr"/>
-            <a:endParaRPr kumimoji="1" lang="ja-JP" altLang="en-US"/>
+            <a:endParaRPr kumimoji="1" lang="ja-JP" altLang="en-US" dirty="0"/>
           </a:p>
         </p:txBody>
       </p:sp>
@@ -4478,7 +4478,7 @@
           <a:lstStyle/>
           <a:p>
             <a:pPr algn="ctr"/>
-            <a:endParaRPr kumimoji="1" lang="ja-JP" altLang="en-US"/>
+            <a:endParaRPr kumimoji="1" lang="ja-JP" altLang="en-US" dirty="0"/>
           </a:p>
         </p:txBody>
       </p:sp>
@@ -4530,7 +4530,7 @@
           <a:lstStyle/>
           <a:p>
             <a:pPr algn="ctr"/>
-            <a:endParaRPr kumimoji="1" lang="ja-JP" altLang="en-US"/>
+            <a:endParaRPr kumimoji="1" lang="ja-JP" altLang="en-US" dirty="0"/>
           </a:p>
         </p:txBody>
       </p:sp>
@@ -4642,7 +4642,7 @@
           <a:lstStyle/>
           <a:p>
             <a:pPr algn="ctr"/>
-            <a:endParaRPr kumimoji="1" lang="ja-JP" altLang="en-US"/>
+            <a:endParaRPr kumimoji="1" lang="ja-JP" altLang="en-US" dirty="0"/>
           </a:p>
         </p:txBody>
       </p:sp>
@@ -4694,7 +4694,7 @@
           <a:lstStyle/>
           <a:p>
             <a:pPr algn="ctr"/>
-            <a:endParaRPr kumimoji="1" lang="ja-JP" altLang="en-US"/>
+            <a:endParaRPr kumimoji="1" lang="ja-JP" altLang="en-US" dirty="0"/>
           </a:p>
         </p:txBody>
       </p:sp>
@@ -4746,7 +4746,7 @@
           <a:lstStyle/>
           <a:p>
             <a:pPr algn="ctr"/>
-            <a:endParaRPr kumimoji="1" lang="ja-JP" altLang="en-US"/>
+            <a:endParaRPr kumimoji="1" lang="ja-JP" altLang="en-US" dirty="0"/>
           </a:p>
         </p:txBody>
       </p:sp>
@@ -4798,7 +4798,7 @@
           <a:lstStyle/>
           <a:p>
             <a:pPr algn="ctr"/>
-            <a:endParaRPr kumimoji="1" lang="ja-JP" altLang="en-US"/>
+            <a:endParaRPr kumimoji="1" lang="ja-JP" altLang="en-US" dirty="0"/>
           </a:p>
         </p:txBody>
       </p:sp>
@@ -4910,7 +4910,7 @@
           <a:lstStyle/>
           <a:p>
             <a:pPr algn="ctr"/>
-            <a:endParaRPr kumimoji="1" lang="ja-JP" altLang="en-US"/>
+            <a:endParaRPr kumimoji="1" lang="ja-JP" altLang="en-US" dirty="0"/>
           </a:p>
         </p:txBody>
       </p:sp>
@@ -5052,7 +5052,7 @@
           <a:lstStyle/>
           <a:p>
             <a:pPr algn="ctr"/>
-            <a:endParaRPr kumimoji="1" lang="ja-JP" altLang="en-US"/>
+            <a:endParaRPr kumimoji="1" lang="ja-JP" altLang="en-US" dirty="0"/>
           </a:p>
         </p:txBody>
       </p:sp>
@@ -5104,7 +5104,7 @@
           <a:lstStyle/>
           <a:p>
             <a:pPr algn="ctr"/>
-            <a:endParaRPr kumimoji="1" lang="ja-JP" altLang="en-US"/>
+            <a:endParaRPr kumimoji="1" lang="ja-JP" altLang="en-US" dirty="0"/>
           </a:p>
         </p:txBody>
       </p:sp>
@@ -5156,7 +5156,7 @@
           <a:lstStyle/>
           <a:p>
             <a:pPr algn="ctr"/>
-            <a:endParaRPr kumimoji="1" lang="ja-JP" altLang="en-US"/>
+            <a:endParaRPr kumimoji="1" lang="ja-JP" altLang="en-US" dirty="0"/>
           </a:p>
         </p:txBody>
       </p:sp>
@@ -5208,7 +5208,7 @@
           <a:lstStyle/>
           <a:p>
             <a:pPr algn="ctr"/>
-            <a:endParaRPr kumimoji="1" lang="ja-JP" altLang="en-US"/>
+            <a:endParaRPr kumimoji="1" lang="ja-JP" altLang="en-US" dirty="0"/>
           </a:p>
         </p:txBody>
       </p:sp>
@@ -5260,7 +5260,7 @@
           <a:lstStyle/>
           <a:p>
             <a:pPr algn="ctr"/>
-            <a:endParaRPr kumimoji="1" lang="ja-JP" altLang="en-US"/>
+            <a:endParaRPr kumimoji="1" lang="ja-JP" altLang="en-US" dirty="0"/>
           </a:p>
         </p:txBody>
       </p:sp>
@@ -5392,7 +5392,7 @@
             <a:lstStyle/>
             <a:p>
               <a:pPr algn="ctr"/>
-              <a:endParaRPr kumimoji="1" lang="ja-JP" altLang="en-US"/>
+              <a:endParaRPr kumimoji="1" lang="ja-JP" altLang="en-US" dirty="0"/>
             </a:p>
           </p:txBody>
         </p:sp>
@@ -5495,7 +5495,7 @@
             <a:lstStyle/>
             <a:p>
               <a:pPr algn="ctr"/>
-              <a:endParaRPr kumimoji="1" lang="ja-JP" altLang="en-US"/>
+              <a:endParaRPr kumimoji="1" lang="ja-JP" altLang="en-US" dirty="0"/>
             </a:p>
           </p:txBody>
         </p:sp>
@@ -5658,7 +5658,7 @@
             <a:lstStyle/>
             <a:p>
               <a:pPr algn="ctr"/>
-              <a:endParaRPr kumimoji="1" lang="ja-JP" altLang="en-US"/>
+              <a:endParaRPr kumimoji="1" lang="ja-JP" altLang="en-US" dirty="0"/>
             </a:p>
           </p:txBody>
         </p:sp>
@@ -5710,7 +5710,7 @@
             <a:lstStyle/>
             <a:p>
               <a:pPr algn="ctr"/>
-              <a:endParaRPr kumimoji="1" lang="ja-JP" altLang="en-US"/>
+              <a:endParaRPr kumimoji="1" lang="ja-JP" altLang="en-US" dirty="0"/>
             </a:p>
           </p:txBody>
         </p:sp>
@@ -5762,7 +5762,7 @@
             <a:lstStyle/>
             <a:p>
               <a:pPr algn="ctr"/>
-              <a:endParaRPr kumimoji="1" lang="ja-JP" altLang="en-US"/>
+              <a:endParaRPr kumimoji="1" lang="ja-JP" altLang="en-US" dirty="0"/>
             </a:p>
           </p:txBody>
         </p:sp>
@@ -5815,7 +5815,7 @@
           <a:lstStyle/>
           <a:p>
             <a:pPr algn="ctr"/>
-            <a:endParaRPr kumimoji="1" lang="ja-JP" altLang="en-US"/>
+            <a:endParaRPr kumimoji="1" lang="ja-JP" altLang="en-US" dirty="0"/>
           </a:p>
         </p:txBody>
       </p:sp>
@@ -5867,7 +5867,7 @@
           <a:lstStyle/>
           <a:p>
             <a:pPr algn="ctr"/>
-            <a:endParaRPr kumimoji="1" lang="ja-JP" altLang="en-US"/>
+            <a:endParaRPr kumimoji="1" lang="ja-JP" altLang="en-US" dirty="0"/>
           </a:p>
         </p:txBody>
       </p:sp>
@@ -5919,7 +5919,7 @@
           <a:lstStyle/>
           <a:p>
             <a:pPr algn="ctr"/>
-            <a:endParaRPr kumimoji="1" lang="ja-JP" altLang="en-US"/>
+            <a:endParaRPr kumimoji="1" lang="ja-JP" altLang="en-US" dirty="0"/>
           </a:p>
         </p:txBody>
       </p:sp>
@@ -6013,36 +6013,109 @@
           <a:chExt cx="0" cy="0"/>
         </a:xfrm>
       </p:grpSpPr>
-      <p:pic>
-        <p:nvPicPr>
-          <p:cNvPr id="4" name="図 3">
-            <a:extLst>
-              <a:ext uri="{FF2B5EF4-FFF2-40B4-BE49-F238E27FC236}">
-                <a16:creationId xmlns:a16="http://schemas.microsoft.com/office/drawing/2014/main" id="{2C801006-A26D-437A-9071-93098FC345AE}"/>
-              </a:ext>
-            </a:extLst>
-          </p:cNvPr>
-          <p:cNvPicPr>
-            <a:picLocks noChangeAspect="1"/>
-          </p:cNvPicPr>
+      <p:grpSp>
+        <p:nvGrpSpPr>
+          <p:cNvPr id="2" name="グループ化 1">
+            <a:extLst>
+              <a:ext uri="{FF2B5EF4-FFF2-40B4-BE49-F238E27FC236}">
+                <a16:creationId xmlns:a16="http://schemas.microsoft.com/office/drawing/2014/main" id="{6B095086-6A1F-4B46-BA76-99C8F6099003}"/>
+              </a:ext>
+            </a:extLst>
+          </p:cNvPr>
+          <p:cNvGrpSpPr/>
           <p:nvPr/>
-        </p:nvPicPr>
-        <p:blipFill>
-          <a:blip r:embed="rId2"/>
-          <a:stretch>
-            <a:fillRect/>
-          </a:stretch>
-        </p:blipFill>
-        <p:spPr>
+        </p:nvGrpSpPr>
+        <p:grpSpPr>
           <a:xfrm>
             <a:off x="0" y="2339687"/>
             <a:ext cx="12192000" cy="2178626"/>
+            <a:chOff x="0" y="2339687"/>
+            <a:chExt cx="12192000" cy="2178626"/>
           </a:xfrm>
-          <a:prstGeom prst="rect">
-            <a:avLst/>
-          </a:prstGeom>
-        </p:spPr>
-      </p:pic>
+        </p:grpSpPr>
+        <p:pic>
+          <p:nvPicPr>
+            <p:cNvPr id="4" name="図 3">
+              <a:extLst>
+                <a:ext uri="{FF2B5EF4-FFF2-40B4-BE49-F238E27FC236}">
+                  <a16:creationId xmlns:a16="http://schemas.microsoft.com/office/drawing/2014/main" id="{2C801006-A26D-437A-9071-93098FC345AE}"/>
+                </a:ext>
+              </a:extLst>
+            </p:cNvPr>
+            <p:cNvPicPr>
+              <a:picLocks noChangeAspect="1"/>
+            </p:cNvPicPr>
+            <p:nvPr/>
+          </p:nvPicPr>
+          <p:blipFill>
+            <a:blip r:embed="rId2"/>
+            <a:stretch>
+              <a:fillRect/>
+            </a:stretch>
+          </p:blipFill>
+          <p:spPr>
+            <a:xfrm>
+              <a:off x="0" y="2339687"/>
+              <a:ext cx="12192000" cy="2178626"/>
+            </a:xfrm>
+            <a:prstGeom prst="rect">
+              <a:avLst/>
+            </a:prstGeom>
+          </p:spPr>
+        </p:pic>
+        <p:sp>
+          <p:nvSpPr>
+            <p:cNvPr id="3" name="正方形/長方形 2">
+              <a:extLst>
+                <a:ext uri="{FF2B5EF4-FFF2-40B4-BE49-F238E27FC236}">
+                  <a16:creationId xmlns:a16="http://schemas.microsoft.com/office/drawing/2014/main" id="{48CD638F-FEC6-496B-AE92-35CABB1979F0}"/>
+                </a:ext>
+              </a:extLst>
+            </p:cNvPr>
+            <p:cNvSpPr/>
+            <p:nvPr/>
+          </p:nvSpPr>
+          <p:spPr>
+            <a:xfrm>
+              <a:off x="10642821" y="2655735"/>
+              <a:ext cx="1319916" cy="278295"/>
+            </a:xfrm>
+            <a:prstGeom prst="rect">
+              <a:avLst/>
+            </a:prstGeom>
+            <a:noFill/>
+            <a:ln w="38100">
+              <a:solidFill>
+                <a:srgbClr val="FF0000"/>
+              </a:solidFill>
+            </a:ln>
+          </p:spPr>
+          <p:style>
+            <a:lnRef idx="2">
+              <a:schemeClr val="accent1">
+                <a:shade val="50000"/>
+              </a:schemeClr>
+            </a:lnRef>
+            <a:fillRef idx="1">
+              <a:schemeClr val="accent1"/>
+            </a:fillRef>
+            <a:effectRef idx="0">
+              <a:schemeClr val="accent1"/>
+            </a:effectRef>
+            <a:fontRef idx="minor">
+              <a:schemeClr val="lt1"/>
+            </a:fontRef>
+          </p:style>
+          <p:txBody>
+            <a:bodyPr rtlCol="0" anchor="ctr"/>
+            <a:lstStyle/>
+            <a:p>
+              <a:pPr algn="ctr"/>
+              <a:endParaRPr kumimoji="1" lang="ja-JP" altLang="en-US" dirty="0"/>
+            </a:p>
+          </p:txBody>
+        </p:sp>
+      </p:grpSp>
     </p:spTree>
     <p:extLst>
       <p:ext uri="{BB962C8B-B14F-4D97-AF65-F5344CB8AC3E}">
@@ -6073,36 +6146,421 @@
           <a:chExt cx="0" cy="0"/>
         </a:xfrm>
       </p:grpSpPr>
-      <p:pic>
-        <p:nvPicPr>
-          <p:cNvPr id="4" name="図 3">
-            <a:extLst>
-              <a:ext uri="{FF2B5EF4-FFF2-40B4-BE49-F238E27FC236}">
-                <a16:creationId xmlns:a16="http://schemas.microsoft.com/office/drawing/2014/main" id="{644CC47E-B79A-48AB-BE1F-E7C0565758E4}"/>
-              </a:ext>
-            </a:extLst>
-          </p:cNvPr>
-          <p:cNvPicPr>
-            <a:picLocks noChangeAspect="1"/>
-          </p:cNvPicPr>
+      <p:grpSp>
+        <p:nvGrpSpPr>
+          <p:cNvPr id="2" name="グループ化 1">
+            <a:extLst>
+              <a:ext uri="{FF2B5EF4-FFF2-40B4-BE49-F238E27FC236}">
+                <a16:creationId xmlns:a16="http://schemas.microsoft.com/office/drawing/2014/main" id="{C79A4CB8-BBEF-4EE2-950F-489DF568FC37}"/>
+              </a:ext>
+            </a:extLst>
+          </p:cNvPr>
+          <p:cNvGrpSpPr/>
           <p:nvPr/>
-        </p:nvPicPr>
-        <p:blipFill>
-          <a:blip r:embed="rId2"/>
-          <a:stretch>
-            <a:fillRect/>
-          </a:stretch>
-        </p:blipFill>
-        <p:spPr>
+        </p:nvGrpSpPr>
+        <p:grpSpPr>
           <a:xfrm>
             <a:off x="3324112" y="0"/>
             <a:ext cx="5543776" cy="6858000"/>
+            <a:chOff x="3324112" y="0"/>
+            <a:chExt cx="5543776" cy="6858000"/>
           </a:xfrm>
-          <a:prstGeom prst="rect">
-            <a:avLst/>
-          </a:prstGeom>
-        </p:spPr>
-      </p:pic>
+        </p:grpSpPr>
+        <p:pic>
+          <p:nvPicPr>
+            <p:cNvPr id="4" name="図 3">
+              <a:extLst>
+                <a:ext uri="{FF2B5EF4-FFF2-40B4-BE49-F238E27FC236}">
+                  <a16:creationId xmlns:a16="http://schemas.microsoft.com/office/drawing/2014/main" id="{644CC47E-B79A-48AB-BE1F-E7C0565758E4}"/>
+                </a:ext>
+              </a:extLst>
+            </p:cNvPr>
+            <p:cNvPicPr>
+              <a:picLocks noChangeAspect="1"/>
+            </p:cNvPicPr>
+            <p:nvPr/>
+          </p:nvPicPr>
+          <p:blipFill>
+            <a:blip r:embed="rId2"/>
+            <a:stretch>
+              <a:fillRect/>
+            </a:stretch>
+          </p:blipFill>
+          <p:spPr>
+            <a:xfrm>
+              <a:off x="3324112" y="0"/>
+              <a:ext cx="5543776" cy="6858000"/>
+            </a:xfrm>
+            <a:prstGeom prst="rect">
+              <a:avLst/>
+            </a:prstGeom>
+          </p:spPr>
+        </p:pic>
+        <p:sp>
+          <p:nvSpPr>
+            <p:cNvPr id="3" name="正方形/長方形 2">
+              <a:extLst>
+                <a:ext uri="{FF2B5EF4-FFF2-40B4-BE49-F238E27FC236}">
+                  <a16:creationId xmlns:a16="http://schemas.microsoft.com/office/drawing/2014/main" id="{7A5B9B99-8C47-44CA-A7C5-EBF5CE668D7A}"/>
+                </a:ext>
+              </a:extLst>
+            </p:cNvPr>
+            <p:cNvSpPr/>
+            <p:nvPr/>
+          </p:nvSpPr>
+          <p:spPr>
+            <a:xfrm>
+              <a:off x="3605915" y="1061499"/>
+              <a:ext cx="2663687" cy="194808"/>
+            </a:xfrm>
+            <a:prstGeom prst="rect">
+              <a:avLst/>
+            </a:prstGeom>
+            <a:noFill/>
+            <a:ln w="38100">
+              <a:solidFill>
+                <a:srgbClr val="FF0000"/>
+              </a:solidFill>
+            </a:ln>
+          </p:spPr>
+          <p:style>
+            <a:lnRef idx="2">
+              <a:schemeClr val="accent1">
+                <a:shade val="50000"/>
+              </a:schemeClr>
+            </a:lnRef>
+            <a:fillRef idx="1">
+              <a:schemeClr val="accent1"/>
+            </a:fillRef>
+            <a:effectRef idx="0">
+              <a:schemeClr val="accent1"/>
+            </a:effectRef>
+            <a:fontRef idx="minor">
+              <a:schemeClr val="lt1"/>
+            </a:fontRef>
+          </p:style>
+          <p:txBody>
+            <a:bodyPr rtlCol="0" anchor="ctr"/>
+            <a:lstStyle/>
+            <a:p>
+              <a:pPr algn="ctr"/>
+              <a:endParaRPr kumimoji="1" lang="ja-JP" altLang="en-US" dirty="0"/>
+            </a:p>
+          </p:txBody>
+        </p:sp>
+        <p:sp>
+          <p:nvSpPr>
+            <p:cNvPr id="5" name="正方形/長方形 4">
+              <a:extLst>
+                <a:ext uri="{FF2B5EF4-FFF2-40B4-BE49-F238E27FC236}">
+                  <a16:creationId xmlns:a16="http://schemas.microsoft.com/office/drawing/2014/main" id="{9290C692-15FE-46D5-AE58-274A0E941FE5}"/>
+                </a:ext>
+              </a:extLst>
+            </p:cNvPr>
+            <p:cNvSpPr/>
+            <p:nvPr/>
+          </p:nvSpPr>
+          <p:spPr>
+            <a:xfrm>
+              <a:off x="3559533" y="2438399"/>
+              <a:ext cx="2536468" cy="591048"/>
+            </a:xfrm>
+            <a:prstGeom prst="rect">
+              <a:avLst/>
+            </a:prstGeom>
+            <a:noFill/>
+            <a:ln w="38100">
+              <a:solidFill>
+                <a:srgbClr val="FF0000"/>
+              </a:solidFill>
+            </a:ln>
+          </p:spPr>
+          <p:style>
+            <a:lnRef idx="2">
+              <a:schemeClr val="accent1">
+                <a:shade val="50000"/>
+              </a:schemeClr>
+            </a:lnRef>
+            <a:fillRef idx="1">
+              <a:schemeClr val="accent1"/>
+            </a:fillRef>
+            <a:effectRef idx="0">
+              <a:schemeClr val="accent1"/>
+            </a:effectRef>
+            <a:fontRef idx="minor">
+              <a:schemeClr val="lt1"/>
+            </a:fontRef>
+          </p:style>
+          <p:txBody>
+            <a:bodyPr rtlCol="0" anchor="ctr"/>
+            <a:lstStyle/>
+            <a:p>
+              <a:pPr algn="ctr"/>
+              <a:endParaRPr kumimoji="1" lang="ja-JP" altLang="en-US" dirty="0"/>
+            </a:p>
+          </p:txBody>
+        </p:sp>
+        <p:sp>
+          <p:nvSpPr>
+            <p:cNvPr id="6" name="正方形/長方形 5">
+              <a:extLst>
+                <a:ext uri="{FF2B5EF4-FFF2-40B4-BE49-F238E27FC236}">
+                  <a16:creationId xmlns:a16="http://schemas.microsoft.com/office/drawing/2014/main" id="{C2FD21A2-C468-46D0-83E1-B340880EE34F}"/>
+                </a:ext>
+              </a:extLst>
+            </p:cNvPr>
+            <p:cNvSpPr/>
+            <p:nvPr/>
+          </p:nvSpPr>
+          <p:spPr>
+            <a:xfrm>
+              <a:off x="3703981" y="3694706"/>
+              <a:ext cx="3002943" cy="280946"/>
+            </a:xfrm>
+            <a:prstGeom prst="rect">
+              <a:avLst/>
+            </a:prstGeom>
+            <a:noFill/>
+            <a:ln w="38100">
+              <a:solidFill>
+                <a:srgbClr val="FF0000"/>
+              </a:solidFill>
+            </a:ln>
+          </p:spPr>
+          <p:style>
+            <a:lnRef idx="2">
+              <a:schemeClr val="accent1">
+                <a:shade val="50000"/>
+              </a:schemeClr>
+            </a:lnRef>
+            <a:fillRef idx="1">
+              <a:schemeClr val="accent1"/>
+            </a:fillRef>
+            <a:effectRef idx="0">
+              <a:schemeClr val="accent1"/>
+            </a:effectRef>
+            <a:fontRef idx="minor">
+              <a:schemeClr val="lt1"/>
+            </a:fontRef>
+          </p:style>
+          <p:txBody>
+            <a:bodyPr rtlCol="0" anchor="ctr"/>
+            <a:lstStyle/>
+            <a:p>
+              <a:pPr algn="ctr"/>
+              <a:endParaRPr kumimoji="1" lang="ja-JP" altLang="en-US" dirty="0"/>
+            </a:p>
+          </p:txBody>
+        </p:sp>
+        <p:sp>
+          <p:nvSpPr>
+            <p:cNvPr id="7" name="正方形/長方形 6">
+              <a:extLst>
+                <a:ext uri="{FF2B5EF4-FFF2-40B4-BE49-F238E27FC236}">
+                  <a16:creationId xmlns:a16="http://schemas.microsoft.com/office/drawing/2014/main" id="{A64F3919-B07B-4727-8242-B225DD49DE91}"/>
+                </a:ext>
+              </a:extLst>
+            </p:cNvPr>
+            <p:cNvSpPr/>
+            <p:nvPr/>
+          </p:nvSpPr>
+          <p:spPr>
+            <a:xfrm>
+              <a:off x="3653624" y="4272501"/>
+              <a:ext cx="1427260" cy="188181"/>
+            </a:xfrm>
+            <a:prstGeom prst="rect">
+              <a:avLst/>
+            </a:prstGeom>
+            <a:noFill/>
+            <a:ln w="38100">
+              <a:solidFill>
+                <a:srgbClr val="FF0000"/>
+              </a:solidFill>
+            </a:ln>
+          </p:spPr>
+          <p:style>
+            <a:lnRef idx="2">
+              <a:schemeClr val="accent1">
+                <a:shade val="50000"/>
+              </a:schemeClr>
+            </a:lnRef>
+            <a:fillRef idx="1">
+              <a:schemeClr val="accent1"/>
+            </a:fillRef>
+            <a:effectRef idx="0">
+              <a:schemeClr val="accent1"/>
+            </a:effectRef>
+            <a:fontRef idx="minor">
+              <a:schemeClr val="lt1"/>
+            </a:fontRef>
+          </p:style>
+          <p:txBody>
+            <a:bodyPr rtlCol="0" anchor="ctr"/>
+            <a:lstStyle/>
+            <a:p>
+              <a:pPr algn="ctr"/>
+              <a:endParaRPr kumimoji="1" lang="ja-JP" altLang="en-US" dirty="0"/>
+            </a:p>
+          </p:txBody>
+        </p:sp>
+        <p:sp>
+          <p:nvSpPr>
+            <p:cNvPr id="8" name="正方形/長方形 7">
+              <a:extLst>
+                <a:ext uri="{FF2B5EF4-FFF2-40B4-BE49-F238E27FC236}">
+                  <a16:creationId xmlns:a16="http://schemas.microsoft.com/office/drawing/2014/main" id="{93237711-2BA3-4EA3-832E-E5BE85F95D3F}"/>
+                </a:ext>
+              </a:extLst>
+            </p:cNvPr>
+            <p:cNvSpPr/>
+            <p:nvPr/>
+          </p:nvSpPr>
+          <p:spPr>
+            <a:xfrm>
+              <a:off x="3703980" y="4905291"/>
+              <a:ext cx="3726513" cy="280946"/>
+            </a:xfrm>
+            <a:prstGeom prst="rect">
+              <a:avLst/>
+            </a:prstGeom>
+            <a:noFill/>
+            <a:ln w="38100">
+              <a:solidFill>
+                <a:srgbClr val="FF0000"/>
+              </a:solidFill>
+            </a:ln>
+          </p:spPr>
+          <p:style>
+            <a:lnRef idx="2">
+              <a:schemeClr val="accent1">
+                <a:shade val="50000"/>
+              </a:schemeClr>
+            </a:lnRef>
+            <a:fillRef idx="1">
+              <a:schemeClr val="accent1"/>
+            </a:fillRef>
+            <a:effectRef idx="0">
+              <a:schemeClr val="accent1"/>
+            </a:effectRef>
+            <a:fontRef idx="minor">
+              <a:schemeClr val="lt1"/>
+            </a:fontRef>
+          </p:style>
+          <p:txBody>
+            <a:bodyPr rtlCol="0" anchor="ctr"/>
+            <a:lstStyle/>
+            <a:p>
+              <a:pPr algn="ctr"/>
+              <a:endParaRPr kumimoji="1" lang="ja-JP" altLang="en-US" dirty="0"/>
+            </a:p>
+          </p:txBody>
+        </p:sp>
+        <p:sp>
+          <p:nvSpPr>
+            <p:cNvPr id="9" name="正方形/長方形 8">
+              <a:extLst>
+                <a:ext uri="{FF2B5EF4-FFF2-40B4-BE49-F238E27FC236}">
+                  <a16:creationId xmlns:a16="http://schemas.microsoft.com/office/drawing/2014/main" id="{FABF0C05-B7A8-480C-84C1-975542FCD26B}"/>
+                </a:ext>
+              </a:extLst>
+            </p:cNvPr>
+            <p:cNvSpPr/>
+            <p:nvPr/>
+          </p:nvSpPr>
+          <p:spPr>
+            <a:xfrm>
+              <a:off x="3703979" y="5656028"/>
+              <a:ext cx="3726513" cy="188181"/>
+            </a:xfrm>
+            <a:prstGeom prst="rect">
+              <a:avLst/>
+            </a:prstGeom>
+            <a:noFill/>
+            <a:ln w="38100">
+              <a:solidFill>
+                <a:srgbClr val="FF0000"/>
+              </a:solidFill>
+            </a:ln>
+          </p:spPr>
+          <p:style>
+            <a:lnRef idx="2">
+              <a:schemeClr val="accent1">
+                <a:shade val="50000"/>
+              </a:schemeClr>
+            </a:lnRef>
+            <a:fillRef idx="1">
+              <a:schemeClr val="accent1"/>
+            </a:fillRef>
+            <a:effectRef idx="0">
+              <a:schemeClr val="accent1"/>
+            </a:effectRef>
+            <a:fontRef idx="minor">
+              <a:schemeClr val="lt1"/>
+            </a:fontRef>
+          </p:style>
+          <p:txBody>
+            <a:bodyPr rtlCol="0" anchor="ctr"/>
+            <a:lstStyle/>
+            <a:p>
+              <a:pPr algn="ctr"/>
+              <a:endParaRPr kumimoji="1" lang="ja-JP" altLang="en-US" dirty="0"/>
+            </a:p>
+          </p:txBody>
+        </p:sp>
+        <p:sp>
+          <p:nvSpPr>
+            <p:cNvPr id="10" name="正方形/長方形 9">
+              <a:extLst>
+                <a:ext uri="{FF2B5EF4-FFF2-40B4-BE49-F238E27FC236}">
+                  <a16:creationId xmlns:a16="http://schemas.microsoft.com/office/drawing/2014/main" id="{A841848B-E270-4392-A8A3-A855CA957062}"/>
+                </a:ext>
+              </a:extLst>
+            </p:cNvPr>
+            <p:cNvSpPr/>
+            <p:nvPr/>
+          </p:nvSpPr>
+          <p:spPr>
+            <a:xfrm>
+              <a:off x="3559533" y="6113226"/>
+              <a:ext cx="1374251" cy="188181"/>
+            </a:xfrm>
+            <a:prstGeom prst="rect">
+              <a:avLst/>
+            </a:prstGeom>
+            <a:noFill/>
+            <a:ln w="38100">
+              <a:solidFill>
+                <a:srgbClr val="FF0000"/>
+              </a:solidFill>
+            </a:ln>
+          </p:spPr>
+          <p:style>
+            <a:lnRef idx="2">
+              <a:schemeClr val="accent1">
+                <a:shade val="50000"/>
+              </a:schemeClr>
+            </a:lnRef>
+            <a:fillRef idx="1">
+              <a:schemeClr val="accent1"/>
+            </a:fillRef>
+            <a:effectRef idx="0">
+              <a:schemeClr val="accent1"/>
+            </a:effectRef>
+            <a:fontRef idx="minor">
+              <a:schemeClr val="lt1"/>
+            </a:fontRef>
+          </p:style>
+          <p:txBody>
+            <a:bodyPr rtlCol="0" anchor="ctr"/>
+            <a:lstStyle/>
+            <a:p>
+              <a:pPr algn="ctr"/>
+              <a:endParaRPr kumimoji="1" lang="ja-JP" altLang="en-US" dirty="0"/>
+            </a:p>
+          </p:txBody>
+        </p:sp>
+      </p:grpSp>
     </p:spTree>
     <p:extLst>
       <p:ext uri="{BB962C8B-B14F-4D97-AF65-F5344CB8AC3E}">
@@ -6133,66 +6591,264 @@
           <a:chExt cx="0" cy="0"/>
         </a:xfrm>
       </p:grpSpPr>
-      <p:pic>
-        <p:nvPicPr>
-          <p:cNvPr id="4" name="図 3">
-            <a:extLst>
-              <a:ext uri="{FF2B5EF4-FFF2-40B4-BE49-F238E27FC236}">
-                <a16:creationId xmlns:a16="http://schemas.microsoft.com/office/drawing/2014/main" id="{497E6AB7-E682-4515-8522-C0007CE2355B}"/>
-              </a:ext>
-            </a:extLst>
-          </p:cNvPr>
-          <p:cNvPicPr>
-            <a:picLocks noChangeAspect="1"/>
-          </p:cNvPicPr>
+      <p:grpSp>
+        <p:nvGrpSpPr>
+          <p:cNvPr id="2" name="グループ化 1">
+            <a:extLst>
+              <a:ext uri="{FF2B5EF4-FFF2-40B4-BE49-F238E27FC236}">
+                <a16:creationId xmlns:a16="http://schemas.microsoft.com/office/drawing/2014/main" id="{70B5D92B-0235-4EDC-AA37-C4C2C7ACCEC7}"/>
+              </a:ext>
+            </a:extLst>
+          </p:cNvPr>
+          <p:cNvGrpSpPr/>
           <p:nvPr/>
-        </p:nvPicPr>
-        <p:blipFill>
-          <a:blip r:embed="rId2"/>
-          <a:stretch>
-            <a:fillRect/>
-          </a:stretch>
-        </p:blipFill>
-        <p:spPr>
+        </p:nvGrpSpPr>
+        <p:grpSpPr>
           <a:xfrm>
             <a:off x="398794" y="0"/>
             <a:ext cx="5128783" cy="6858000"/>
+            <a:chOff x="398794" y="0"/>
+            <a:chExt cx="5128783" cy="6858000"/>
           </a:xfrm>
-          <a:prstGeom prst="rect">
-            <a:avLst/>
-          </a:prstGeom>
-        </p:spPr>
-      </p:pic>
-      <p:pic>
-        <p:nvPicPr>
-          <p:cNvPr id="5" name="図 4">
-            <a:extLst>
-              <a:ext uri="{FF2B5EF4-FFF2-40B4-BE49-F238E27FC236}">
-                <a16:creationId xmlns:a16="http://schemas.microsoft.com/office/drawing/2014/main" id="{005C5993-B335-40B6-B917-74BD2A158FC6}"/>
-              </a:ext>
-            </a:extLst>
-          </p:cNvPr>
-          <p:cNvPicPr>
-            <a:picLocks noChangeAspect="1"/>
-          </p:cNvPicPr>
+        </p:grpSpPr>
+        <p:pic>
+          <p:nvPicPr>
+            <p:cNvPr id="4" name="図 3">
+              <a:extLst>
+                <a:ext uri="{FF2B5EF4-FFF2-40B4-BE49-F238E27FC236}">
+                  <a16:creationId xmlns:a16="http://schemas.microsoft.com/office/drawing/2014/main" id="{497E6AB7-E682-4515-8522-C0007CE2355B}"/>
+                </a:ext>
+              </a:extLst>
+            </p:cNvPr>
+            <p:cNvPicPr>
+              <a:picLocks noChangeAspect="1"/>
+            </p:cNvPicPr>
+            <p:nvPr/>
+          </p:nvPicPr>
+          <p:blipFill>
+            <a:blip r:embed="rId2"/>
+            <a:stretch>
+              <a:fillRect/>
+            </a:stretch>
+          </p:blipFill>
+          <p:spPr>
+            <a:xfrm>
+              <a:off x="398794" y="0"/>
+              <a:ext cx="5128783" cy="6858000"/>
+            </a:xfrm>
+            <a:prstGeom prst="rect">
+              <a:avLst/>
+            </a:prstGeom>
+          </p:spPr>
+        </p:pic>
+        <p:sp>
+          <p:nvSpPr>
+            <p:cNvPr id="6" name="正方形/長方形 5">
+              <a:extLst>
+                <a:ext uri="{FF2B5EF4-FFF2-40B4-BE49-F238E27FC236}">
+                  <a16:creationId xmlns:a16="http://schemas.microsoft.com/office/drawing/2014/main" id="{D5DE0E2B-5B9B-4A13-B3A8-1D29BE595EB4}"/>
+                </a:ext>
+              </a:extLst>
+            </p:cNvPr>
+            <p:cNvSpPr/>
+            <p:nvPr/>
+          </p:nvSpPr>
+          <p:spPr>
+            <a:xfrm>
+              <a:off x="500931" y="637925"/>
+              <a:ext cx="3681455" cy="194808"/>
+            </a:xfrm>
+            <a:prstGeom prst="rect">
+              <a:avLst/>
+            </a:prstGeom>
+            <a:noFill/>
+            <a:ln w="38100">
+              <a:solidFill>
+                <a:srgbClr val="FF0000"/>
+              </a:solidFill>
+            </a:ln>
+          </p:spPr>
+          <p:style>
+            <a:lnRef idx="2">
+              <a:schemeClr val="accent1">
+                <a:shade val="50000"/>
+              </a:schemeClr>
+            </a:lnRef>
+            <a:fillRef idx="1">
+              <a:schemeClr val="accent1"/>
+            </a:fillRef>
+            <a:effectRef idx="0">
+              <a:schemeClr val="accent1"/>
+            </a:effectRef>
+            <a:fontRef idx="minor">
+              <a:schemeClr val="lt1"/>
+            </a:fontRef>
+          </p:style>
+          <p:txBody>
+            <a:bodyPr rtlCol="0" anchor="ctr"/>
+            <a:lstStyle/>
+            <a:p>
+              <a:pPr algn="ctr"/>
+              <a:endParaRPr kumimoji="1" lang="ja-JP" altLang="en-US" dirty="0"/>
+            </a:p>
+          </p:txBody>
+        </p:sp>
+        <p:sp>
+          <p:nvSpPr>
+            <p:cNvPr id="7" name="正方形/長方形 6">
+              <a:extLst>
+                <a:ext uri="{FF2B5EF4-FFF2-40B4-BE49-F238E27FC236}">
+                  <a16:creationId xmlns:a16="http://schemas.microsoft.com/office/drawing/2014/main" id="{B4909A73-9C5A-4AAB-9193-2B8D51B51232}"/>
+                </a:ext>
+              </a:extLst>
+            </p:cNvPr>
+            <p:cNvSpPr/>
+            <p:nvPr/>
+          </p:nvSpPr>
+          <p:spPr>
+            <a:xfrm>
+              <a:off x="530086" y="3171739"/>
+              <a:ext cx="2384067" cy="1817703"/>
+            </a:xfrm>
+            <a:prstGeom prst="rect">
+              <a:avLst/>
+            </a:prstGeom>
+            <a:noFill/>
+            <a:ln w="38100">
+              <a:solidFill>
+                <a:srgbClr val="FF0000"/>
+              </a:solidFill>
+            </a:ln>
+          </p:spPr>
+          <p:style>
+            <a:lnRef idx="2">
+              <a:schemeClr val="accent1">
+                <a:shade val="50000"/>
+              </a:schemeClr>
+            </a:lnRef>
+            <a:fillRef idx="1">
+              <a:schemeClr val="accent1"/>
+            </a:fillRef>
+            <a:effectRef idx="0">
+              <a:schemeClr val="accent1"/>
+            </a:effectRef>
+            <a:fontRef idx="minor">
+              <a:schemeClr val="lt1"/>
+            </a:fontRef>
+          </p:style>
+          <p:txBody>
+            <a:bodyPr rtlCol="0" anchor="ctr"/>
+            <a:lstStyle/>
+            <a:p>
+              <a:pPr algn="ctr"/>
+              <a:endParaRPr kumimoji="1" lang="ja-JP" altLang="en-US" dirty="0"/>
+            </a:p>
+          </p:txBody>
+        </p:sp>
+      </p:grpSp>
+      <p:grpSp>
+        <p:nvGrpSpPr>
+          <p:cNvPr id="3" name="グループ化 2">
+            <a:extLst>
+              <a:ext uri="{FF2B5EF4-FFF2-40B4-BE49-F238E27FC236}">
+                <a16:creationId xmlns:a16="http://schemas.microsoft.com/office/drawing/2014/main" id="{5B3001BD-FD24-4979-8231-AD5356EBB161}"/>
+              </a:ext>
+            </a:extLst>
+          </p:cNvPr>
+          <p:cNvGrpSpPr/>
           <p:nvPr/>
-        </p:nvPicPr>
-        <p:blipFill>
-          <a:blip r:embed="rId3"/>
-          <a:stretch>
-            <a:fillRect/>
-          </a:stretch>
-        </p:blipFill>
-        <p:spPr>
+        </p:nvGrpSpPr>
+        <p:grpSpPr>
           <a:xfrm>
             <a:off x="6227100" y="637925"/>
             <a:ext cx="5128783" cy="1495293"/>
+            <a:chOff x="6227100" y="637925"/>
+            <a:chExt cx="5128783" cy="1495293"/>
           </a:xfrm>
-          <a:prstGeom prst="rect">
-            <a:avLst/>
-          </a:prstGeom>
-        </p:spPr>
-      </p:pic>
+        </p:grpSpPr>
+        <p:pic>
+          <p:nvPicPr>
+            <p:cNvPr id="5" name="図 4">
+              <a:extLst>
+                <a:ext uri="{FF2B5EF4-FFF2-40B4-BE49-F238E27FC236}">
+                  <a16:creationId xmlns:a16="http://schemas.microsoft.com/office/drawing/2014/main" id="{005C5993-B335-40B6-B917-74BD2A158FC6}"/>
+                </a:ext>
+              </a:extLst>
+            </p:cNvPr>
+            <p:cNvPicPr>
+              <a:picLocks noChangeAspect="1"/>
+            </p:cNvPicPr>
+            <p:nvPr/>
+          </p:nvPicPr>
+          <p:blipFill>
+            <a:blip r:embed="rId3"/>
+            <a:stretch>
+              <a:fillRect/>
+            </a:stretch>
+          </p:blipFill>
+          <p:spPr>
+            <a:xfrm>
+              <a:off x="6227100" y="637925"/>
+              <a:ext cx="5128783" cy="1495293"/>
+            </a:xfrm>
+            <a:prstGeom prst="rect">
+              <a:avLst/>
+            </a:prstGeom>
+          </p:spPr>
+        </p:pic>
+        <p:sp>
+          <p:nvSpPr>
+            <p:cNvPr id="8" name="正方形/長方形 7">
+              <a:extLst>
+                <a:ext uri="{FF2B5EF4-FFF2-40B4-BE49-F238E27FC236}">
+                  <a16:creationId xmlns:a16="http://schemas.microsoft.com/office/drawing/2014/main" id="{3473F4A6-E024-4AB9-AD1D-82B552B37C63}"/>
+                </a:ext>
+              </a:extLst>
+            </p:cNvPr>
+            <p:cNvSpPr/>
+            <p:nvPr/>
+          </p:nvSpPr>
+          <p:spPr>
+            <a:xfrm>
+              <a:off x="10841452" y="1919027"/>
+              <a:ext cx="465548" cy="214191"/>
+            </a:xfrm>
+            <a:prstGeom prst="rect">
+              <a:avLst/>
+            </a:prstGeom>
+            <a:noFill/>
+            <a:ln w="38100">
+              <a:solidFill>
+                <a:srgbClr val="FF0000"/>
+              </a:solidFill>
+            </a:ln>
+          </p:spPr>
+          <p:style>
+            <a:lnRef idx="2">
+              <a:schemeClr val="accent1">
+                <a:shade val="50000"/>
+              </a:schemeClr>
+            </a:lnRef>
+            <a:fillRef idx="1">
+              <a:schemeClr val="accent1"/>
+            </a:fillRef>
+            <a:effectRef idx="0">
+              <a:schemeClr val="accent1"/>
+            </a:effectRef>
+            <a:fontRef idx="minor">
+              <a:schemeClr val="lt1"/>
+            </a:fontRef>
+          </p:style>
+          <p:txBody>
+            <a:bodyPr rtlCol="0" anchor="ctr"/>
+            <a:lstStyle/>
+            <a:p>
+              <a:pPr algn="ctr"/>
+              <a:endParaRPr kumimoji="1" lang="ja-JP" altLang="en-US" dirty="0"/>
+            </a:p>
+          </p:txBody>
+        </p:sp>
+      </p:grpSp>
     </p:spTree>
     <p:extLst>
       <p:ext uri="{BB962C8B-B14F-4D97-AF65-F5344CB8AC3E}">
@@ -6301,7 +6957,7 @@
           <a:lstStyle/>
           <a:p>
             <a:pPr algn="ctr"/>
-            <a:endParaRPr kumimoji="1" lang="ja-JP" altLang="en-US"/>
+            <a:endParaRPr kumimoji="1" lang="ja-JP" altLang="en-US" dirty="0"/>
           </a:p>
         </p:txBody>
       </p:sp>

</xml_diff>